<commit_message>
examples up to 15 were changed, pdf`s added
</commit_message>
<xml_diff>
--- a/presentations/example13.pptx
+++ b/presentations/example13.pptx
@@ -9,6 +9,7 @@
     <p:sldId id="258" r:id="rId3"/>
     <p:sldId id="259" r:id="rId4"/>
     <p:sldId id="260" r:id="rId5"/>
+    <p:sldId id="261" r:id="rId6"/>
   </p:sldIdLst>
   <p:sldSz cx="12192000" cy="6858000"/>
   <p:notesSz cx="6858000" cy="9144000"/>
@@ -244,7 +245,7 @@
           <a:p>
             <a:fld id="{74A6B15C-ADB0-4957-B33F-4CF21949A72A}" type="datetimeFigureOut">
               <a:rPr lang="en-US" smtClean="0"/>
-              <a:t>5/8/2021</a:t>
+              <a:t>5/10/2021</a:t>
             </a:fld>
             <a:endParaRPr lang="en-US"/>
           </a:p>
@@ -412,7 +413,7 @@
           <a:p>
             <a:fld id="{74A6B15C-ADB0-4957-B33F-4CF21949A72A}" type="datetimeFigureOut">
               <a:rPr lang="en-US" smtClean="0"/>
-              <a:t>5/8/2021</a:t>
+              <a:t>5/10/2021</a:t>
             </a:fld>
             <a:endParaRPr lang="en-US"/>
           </a:p>
@@ -590,7 +591,7 @@
           <a:p>
             <a:fld id="{74A6B15C-ADB0-4957-B33F-4CF21949A72A}" type="datetimeFigureOut">
               <a:rPr lang="en-US" smtClean="0"/>
-              <a:t>5/8/2021</a:t>
+              <a:t>5/10/2021</a:t>
             </a:fld>
             <a:endParaRPr lang="en-US"/>
           </a:p>
@@ -758,7 +759,7 @@
           <a:p>
             <a:fld id="{74A6B15C-ADB0-4957-B33F-4CF21949A72A}" type="datetimeFigureOut">
               <a:rPr lang="en-US" smtClean="0"/>
-              <a:t>5/8/2021</a:t>
+              <a:t>5/10/2021</a:t>
             </a:fld>
             <a:endParaRPr lang="en-US"/>
           </a:p>
@@ -1003,7 +1004,7 @@
           <a:p>
             <a:fld id="{74A6B15C-ADB0-4957-B33F-4CF21949A72A}" type="datetimeFigureOut">
               <a:rPr lang="en-US" smtClean="0"/>
-              <a:t>5/8/2021</a:t>
+              <a:t>5/10/2021</a:t>
             </a:fld>
             <a:endParaRPr lang="en-US"/>
           </a:p>
@@ -1232,7 +1233,7 @@
           <a:p>
             <a:fld id="{74A6B15C-ADB0-4957-B33F-4CF21949A72A}" type="datetimeFigureOut">
               <a:rPr lang="en-US" smtClean="0"/>
-              <a:t>5/8/2021</a:t>
+              <a:t>5/10/2021</a:t>
             </a:fld>
             <a:endParaRPr lang="en-US"/>
           </a:p>
@@ -1596,7 +1597,7 @@
           <a:p>
             <a:fld id="{74A6B15C-ADB0-4957-B33F-4CF21949A72A}" type="datetimeFigureOut">
               <a:rPr lang="en-US" smtClean="0"/>
-              <a:t>5/8/2021</a:t>
+              <a:t>5/10/2021</a:t>
             </a:fld>
             <a:endParaRPr lang="en-US"/>
           </a:p>
@@ -1713,7 +1714,7 @@
           <a:p>
             <a:fld id="{74A6B15C-ADB0-4957-B33F-4CF21949A72A}" type="datetimeFigureOut">
               <a:rPr lang="en-US" smtClean="0"/>
-              <a:t>5/8/2021</a:t>
+              <a:t>5/10/2021</a:t>
             </a:fld>
             <a:endParaRPr lang="en-US"/>
           </a:p>
@@ -1808,7 +1809,7 @@
           <a:p>
             <a:fld id="{74A6B15C-ADB0-4957-B33F-4CF21949A72A}" type="datetimeFigureOut">
               <a:rPr lang="en-US" smtClean="0"/>
-              <a:t>5/8/2021</a:t>
+              <a:t>5/10/2021</a:t>
             </a:fld>
             <a:endParaRPr lang="en-US"/>
           </a:p>
@@ -2083,7 +2084,7 @@
           <a:p>
             <a:fld id="{74A6B15C-ADB0-4957-B33F-4CF21949A72A}" type="datetimeFigureOut">
               <a:rPr lang="en-US" smtClean="0"/>
-              <a:t>5/8/2021</a:t>
+              <a:t>5/10/2021</a:t>
             </a:fld>
             <a:endParaRPr lang="en-US"/>
           </a:p>
@@ -2335,7 +2336,7 @@
           <a:p>
             <a:fld id="{74A6B15C-ADB0-4957-B33F-4CF21949A72A}" type="datetimeFigureOut">
               <a:rPr lang="en-US" smtClean="0"/>
-              <a:t>5/8/2021</a:t>
+              <a:t>5/10/2021</a:t>
             </a:fld>
             <a:endParaRPr lang="en-US"/>
           </a:p>
@@ -2546,7 +2547,7 @@
           <a:p>
             <a:fld id="{74A6B15C-ADB0-4957-B33F-4CF21949A72A}" type="datetimeFigureOut">
               <a:rPr lang="en-US" smtClean="0"/>
-              <a:t>5/8/2021</a:t>
+              <a:t>5/10/2021</a:t>
             </a:fld>
             <a:endParaRPr lang="en-US"/>
           </a:p>
@@ -2992,7 +2993,12 @@
             <p:ph idx="1"/>
           </p:nvPr>
         </p:nvSpPr>
-        <p:spPr/>
+        <p:spPr>
+          <a:xfrm>
+            <a:off x="838200" y="1690688"/>
+            <a:ext cx="10515600" cy="4351338"/>
+          </a:xfrm>
+        </p:spPr>
         <p:txBody>
           <a:bodyPr>
             <a:normAutofit/>
@@ -3008,7 +3014,15 @@
             </a:r>
             <a:r>
               <a:rPr lang="ru-RU" dirty="0"/>
-              <a:t> способен определять и добавлять зависимости автоматически, что может значительно уменьшить объём конфигураций(написанного кода), но в то же время делает более затруднительнее чтение и проверку зависимостей.</a:t>
+              <a:t> способен определять и добавлять зависимости автоматически, что может значительно уменьшить объём конфигураций(написанного кода), но в то же время делает </a:t>
+            </a:r>
+            <a:r>
+              <a:rPr lang="ru-RU" dirty="0" smtClean="0"/>
+              <a:t>затруднительнее </a:t>
+            </a:r>
+            <a:r>
+              <a:rPr lang="ru-RU" dirty="0"/>
+              <a:t>чтение и проверку зависимостей.</a:t>
             </a:r>
           </a:p>
           <a:p>
@@ -3077,99 +3091,6 @@
               <a:buNone/>
             </a:pPr>
             <a:endParaRPr lang="en-US" dirty="0"/>
-          </a:p>
-        </p:txBody>
-      </p:sp>
-      <p:sp>
-        <p:nvSpPr>
-          <p:cNvPr id="4" name="TextBox 3">
-            <a:extLst>
-              <a:ext uri="{FF2B5EF4-FFF2-40B4-BE49-F238E27FC236}">
-                <a16:creationId xmlns:a16="http://schemas.microsoft.com/office/drawing/2014/main" id="{A81AF648-8A37-4F97-A8E8-A3BC76120E52}"/>
-              </a:ext>
-            </a:extLst>
-          </p:cNvPr>
-          <p:cNvSpPr txBox="1"/>
-          <p:nvPr/>
-        </p:nvSpPr>
-        <p:spPr>
-          <a:xfrm>
-            <a:off x="-186266" y="6176963"/>
-            <a:ext cx="12747272" cy="646331"/>
-          </a:xfrm>
-          <a:prstGeom prst="rect">
-            <a:avLst/>
-          </a:prstGeom>
-          <a:noFill/>
-        </p:spPr>
-        <p:txBody>
-          <a:bodyPr wrap="none" rtlCol="0">
-            <a:spAutoFit/>
-          </a:bodyPr>
-          <a:lstStyle/>
-          <a:p>
-            <a:r>
-              <a:rPr lang="en-CA" dirty="0"/>
-              <a:t>(</a:t>
-            </a:r>
-            <a:r>
-              <a:rPr lang="ru-RU" dirty="0"/>
-              <a:t>Тут лучше расписать конкретно, как работает,</a:t>
-            </a:r>
-            <a:r>
-              <a:rPr lang="en-CA" dirty="0"/>
-              <a:t> </a:t>
-            </a:r>
-            <a:r>
-              <a:rPr lang="en-CA" dirty="0" err="1"/>
-              <a:t>byName</a:t>
-            </a:r>
-            <a:r>
-              <a:rPr lang="en-CA" dirty="0"/>
-              <a:t>, </a:t>
-            </a:r>
-            <a:r>
-              <a:rPr lang="ru-RU" dirty="0"/>
-              <a:t>к примеру. При создании класса</a:t>
-            </a:r>
-            <a:r>
-              <a:rPr lang="en-CA" dirty="0"/>
-              <a:t> </a:t>
-            </a:r>
-            <a:r>
-              <a:rPr lang="en-CA" dirty="0" err="1"/>
-              <a:t>petPerson</a:t>
-            </a:r>
-            <a:r>
-              <a:rPr lang="ru-RU" dirty="0"/>
-              <a:t>, смотрит на имя переменной</a:t>
-            </a:r>
-          </a:p>
-          <a:p>
-            <a:r>
-              <a:rPr lang="en-CA" dirty="0"/>
-              <a:t>Animal</a:t>
-            </a:r>
-            <a:r>
-              <a:rPr lang="ru-RU" dirty="0"/>
-              <a:t>, находит </a:t>
-            </a:r>
-            <a:r>
-              <a:rPr lang="en-CA" dirty="0"/>
-              <a:t>animal </a:t>
-            </a:r>
-            <a:r>
-              <a:rPr lang="ru-RU" dirty="0"/>
-              <a:t>бин, и подставляет его по имени</a:t>
-            </a:r>
-            <a:r>
-              <a:rPr lang="en-CA" dirty="0"/>
-              <a:t>)</a:t>
-            </a:r>
-            <a:r>
-              <a:rPr lang="ru-RU" dirty="0"/>
-              <a:t> </a:t>
-            </a:r>
           </a:p>
         </p:txBody>
       </p:sp>
@@ -3903,7 +3824,15 @@
             </a:r>
             <a:r>
               <a:rPr lang="ru-RU" dirty="0"/>
-              <a:t> - разные, поэтому связывания не произойдёт.</a:t>
+              <a:t> - разные, поэтому связывания не произойдёт</a:t>
+            </a:r>
+            <a:r>
+              <a:rPr lang="ru-RU" dirty="0" smtClean="0"/>
+              <a:t>.</a:t>
+            </a:r>
+            <a:r>
+              <a:rPr lang="en-US" dirty="0" smtClean="0"/>
+              <a:t> </a:t>
             </a:r>
           </a:p>
           <a:p>
@@ -3912,12 +3841,1110 @@
             </a:pPr>
             <a:endParaRPr lang="en-US" dirty="0"/>
           </a:p>
+          <a:p>
+            <a:pPr marL="514350" indent="-514350">
+              <a:buAutoNum type="arabicPeriod"/>
+            </a:pPr>
+            <a:endParaRPr lang="en-US" dirty="0" smtClean="0"/>
+          </a:p>
+          <a:p>
+            <a:pPr marL="514350" indent="-514350">
+              <a:buAutoNum type="arabicPeriod"/>
+            </a:pPr>
+            <a:endParaRPr lang="en-US" dirty="0"/>
+          </a:p>
+          <a:p>
+            <a:pPr marL="0" indent="0">
+              <a:buNone/>
+            </a:pPr>
+            <a:r>
+              <a:rPr lang="ru-RU" dirty="0" smtClean="0"/>
+              <a:t>При создании</a:t>
+            </a:r>
+            <a:r>
+              <a:rPr lang="ru-RU" dirty="0"/>
+              <a:t> </a:t>
+            </a:r>
+            <a:r>
+              <a:rPr lang="ru-RU" dirty="0" smtClean="0"/>
+              <a:t>класса</a:t>
+            </a:r>
+            <a:r>
+              <a:rPr lang="en-CA" dirty="0" smtClean="0"/>
+              <a:t> </a:t>
+            </a:r>
+            <a:r>
+              <a:rPr lang="en-CA" dirty="0" err="1"/>
+              <a:t>petPerson</a:t>
+            </a:r>
+            <a:r>
+              <a:rPr lang="ru-RU" dirty="0"/>
+              <a:t>, </a:t>
+            </a:r>
+            <a:r>
+              <a:rPr lang="ru-RU" dirty="0" smtClean="0"/>
+              <a:t>контейнер «смотрит» </a:t>
+            </a:r>
+            <a:r>
+              <a:rPr lang="ru-RU" dirty="0"/>
+              <a:t>на </a:t>
+            </a:r>
+            <a:r>
+              <a:rPr lang="ru-RU" dirty="0" smtClean="0"/>
+              <a:t>класс(тип) поля (в нашем случае </a:t>
+            </a:r>
+            <a:r>
+              <a:rPr lang="en-CA" dirty="0" smtClean="0"/>
+              <a:t>Animal</a:t>
+            </a:r>
+            <a:r>
+              <a:rPr lang="ru-RU" dirty="0"/>
+              <a:t>)</a:t>
+            </a:r>
+            <a:r>
+              <a:rPr lang="ru-RU" dirty="0" smtClean="0"/>
+              <a:t>, </a:t>
+            </a:r>
+            <a:r>
+              <a:rPr lang="ru-RU" dirty="0"/>
+              <a:t>находит </a:t>
+            </a:r>
+            <a:r>
+              <a:rPr lang="en-CA" dirty="0"/>
+              <a:t>animal </a:t>
+            </a:r>
+            <a:r>
+              <a:rPr lang="ru-RU" dirty="0"/>
+              <a:t>бин, и подставляет его по </a:t>
+            </a:r>
+            <a:r>
+              <a:rPr lang="ru-RU" dirty="0" smtClean="0"/>
+              <a:t>имени.</a:t>
+            </a:r>
+            <a:endParaRPr lang="ru-RU" dirty="0"/>
+          </a:p>
+          <a:p>
+            <a:pPr marL="514350" indent="-514350">
+              <a:buAutoNum type="arabicPeriod"/>
+            </a:pPr>
+            <a:endParaRPr lang="en-US" dirty="0"/>
+          </a:p>
+        </p:txBody>
+      </p:sp>
+      <p:sp>
+        <p:nvSpPr>
+          <p:cNvPr id="2" name="Rectangle 1"/>
+          <p:cNvSpPr>
+            <a:spLocks noChangeArrowheads="1"/>
+          </p:cNvSpPr>
+          <p:nvPr/>
+        </p:nvSpPr>
+        <p:spPr bwMode="auto">
+          <a:xfrm>
+            <a:off x="1247775" y="2991212"/>
+            <a:ext cx="2935419" cy="707886"/>
+          </a:xfrm>
+          <a:prstGeom prst="rect">
+            <a:avLst/>
+          </a:prstGeom>
+          <a:solidFill>
+            <a:srgbClr val="2B2B2B"/>
+          </a:solidFill>
+          <a:ln>
+            <a:noFill/>
+          </a:ln>
+          <a:effectLst/>
+          <a:extLst>
+            <a:ext uri="{91240B29-F687-4F45-9708-019B960494DF}">
+              <a14:hiddenLine xmlns:a14="http://schemas.microsoft.com/office/drawing/2010/main" w="9525">
+                <a:solidFill>
+                  <a:schemeClr val="tx1"/>
+                </a:solidFill>
+                <a:miter lim="800000"/>
+                <a:headEnd/>
+                <a:tailEnd/>
+              </a14:hiddenLine>
+            </a:ext>
+            <a:ext uri="{AF507438-7753-43E0-B8FC-AC1667EBCBE1}">
+              <a14:hiddenEffects xmlns:a14="http://schemas.microsoft.com/office/drawing/2010/main">
+                <a:effectLst>
+                  <a:outerShdw dist="35921" dir="2700000" algn="ctr" rotWithShape="0">
+                    <a:schemeClr val="bg2"/>
+                  </a:outerShdw>
+                </a:effectLst>
+              </a14:hiddenEffects>
+            </a:ext>
+          </a:extLst>
+        </p:spPr>
+        <p:txBody>
+          <a:bodyPr vert="horz" wrap="none" lIns="91440" tIns="45720" rIns="91440" bIns="45720" numCol="1" anchor="ctr" anchorCtr="0" compatLnSpc="1">
+            <a:prstTxWarp prst="textNoShape">
+              <a:avLst/>
+            </a:prstTxWarp>
+            <a:spAutoFit/>
+          </a:bodyPr>
+          <a:lstStyle/>
+          <a:p>
+            <a:pPr marL="0" marR="0" lvl="0" indent="0" algn="l" defTabSz="914400" rtl="0" eaLnBrk="0" fontAlgn="base" latinLnBrk="0" hangingPunct="0">
+              <a:lnSpc>
+                <a:spcPct val="100000"/>
+              </a:lnSpc>
+              <a:spcBef>
+                <a:spcPct val="0"/>
+              </a:spcBef>
+              <a:spcAft>
+                <a:spcPct val="0"/>
+              </a:spcAft>
+              <a:buClrTx/>
+              <a:buSzTx/>
+              <a:buFontTx/>
+              <a:buNone/>
+              <a:tabLst/>
+            </a:pPr>
+            <a:r>
+              <a:rPr kumimoji="0" lang="en-US" altLang="en-US" sz="2000" b="0" i="0" u="none" strike="noStrike" cap="none" normalizeH="0" baseline="0" dirty="0" smtClean="0">
+                <a:ln>
+                  <a:noFill/>
+                </a:ln>
+                <a:solidFill>
+                  <a:srgbClr val="CC7832"/>
+                </a:solidFill>
+                <a:effectLst/>
+                <a:latin typeface="JetBrains Mono"/>
+              </a:rPr>
+              <a:t>public class </a:t>
+            </a:r>
+            <a:r>
+              <a:rPr kumimoji="0" lang="en-US" altLang="en-US" sz="2000" b="0" i="0" u="none" strike="noStrike" cap="none" normalizeH="0" baseline="0" dirty="0" err="1" smtClean="0">
+                <a:ln>
+                  <a:noFill/>
+                </a:ln>
+                <a:solidFill>
+                  <a:srgbClr val="A9B7C6"/>
+                </a:solidFill>
+                <a:effectLst/>
+                <a:latin typeface="JetBrains Mono"/>
+              </a:rPr>
+              <a:t>PetPerson</a:t>
+            </a:r>
+            <a:r>
+              <a:rPr kumimoji="0" lang="en-US" altLang="en-US" sz="2000" b="0" i="0" u="none" strike="noStrike" cap="none" normalizeH="0" baseline="0" dirty="0" smtClean="0">
+                <a:ln>
+                  <a:noFill/>
+                </a:ln>
+                <a:solidFill>
+                  <a:srgbClr val="A9B7C6"/>
+                </a:solidFill>
+                <a:effectLst/>
+                <a:latin typeface="JetBrains Mono"/>
+              </a:rPr>
+              <a:t> {</a:t>
+            </a:r>
+            <a:br>
+              <a:rPr kumimoji="0" lang="en-US" altLang="en-US" sz="2000" b="0" i="0" u="none" strike="noStrike" cap="none" normalizeH="0" baseline="0" dirty="0" smtClean="0">
+                <a:ln>
+                  <a:noFill/>
+                </a:ln>
+                <a:solidFill>
+                  <a:srgbClr val="A9B7C6"/>
+                </a:solidFill>
+                <a:effectLst/>
+                <a:latin typeface="JetBrains Mono"/>
+              </a:rPr>
+            </a:br>
+            <a:r>
+              <a:rPr kumimoji="0" lang="en-US" altLang="en-US" sz="2000" b="0" i="0" u="none" strike="noStrike" cap="none" normalizeH="0" baseline="0" dirty="0" smtClean="0">
+                <a:ln>
+                  <a:noFill/>
+                </a:ln>
+                <a:solidFill>
+                  <a:srgbClr val="A9B7C6"/>
+                </a:solidFill>
+                <a:effectLst/>
+                <a:latin typeface="JetBrains Mono"/>
+              </a:rPr>
+              <a:t>    Animal </a:t>
+            </a:r>
+            <a:r>
+              <a:rPr kumimoji="0" lang="en-US" altLang="en-US" sz="2000" b="0" i="0" u="none" strike="noStrike" cap="none" normalizeH="0" baseline="0" dirty="0" err="1" smtClean="0">
+                <a:ln>
+                  <a:noFill/>
+                </a:ln>
+                <a:solidFill>
+                  <a:srgbClr val="9876AA"/>
+                </a:solidFill>
+                <a:effectLst/>
+                <a:latin typeface="JetBrains Mono"/>
+              </a:rPr>
+              <a:t>animal</a:t>
+            </a:r>
+            <a:r>
+              <a:rPr kumimoji="0" lang="en-US" altLang="en-US" sz="2000" b="0" i="0" u="none" strike="noStrike" cap="none" normalizeH="0" baseline="0" dirty="0" smtClean="0">
+                <a:ln>
+                  <a:noFill/>
+                </a:ln>
+                <a:solidFill>
+                  <a:srgbClr val="CC7832"/>
+                </a:solidFill>
+                <a:effectLst/>
+                <a:latin typeface="JetBrains Mono"/>
+              </a:rPr>
+              <a:t>;</a:t>
+            </a:r>
+            <a:endParaRPr kumimoji="0" lang="en-US" altLang="en-US" sz="2000" b="0" i="0" u="none" strike="noStrike" cap="none" normalizeH="0" baseline="0" dirty="0" smtClean="0">
+              <a:ln>
+                <a:noFill/>
+              </a:ln>
+              <a:solidFill>
+                <a:schemeClr val="tx1"/>
+              </a:solidFill>
+              <a:effectLst/>
+              <a:latin typeface="Arial" panose="020B0604020202020204" pitchFamily="34" charset="0"/>
+            </a:endParaRPr>
+          </a:p>
+        </p:txBody>
+      </p:sp>
+      <p:sp>
+        <p:nvSpPr>
+          <p:cNvPr id="4" name="Rectangle 2"/>
+          <p:cNvSpPr>
+            <a:spLocks noChangeArrowheads="1"/>
+          </p:cNvSpPr>
+          <p:nvPr/>
+        </p:nvSpPr>
+        <p:spPr bwMode="auto">
+          <a:xfrm>
+            <a:off x="5183195" y="2375659"/>
+            <a:ext cx="6037255" cy="1323439"/>
+          </a:xfrm>
+          <a:prstGeom prst="rect">
+            <a:avLst/>
+          </a:prstGeom>
+          <a:solidFill>
+            <a:srgbClr val="2B2B2B"/>
+          </a:solidFill>
+          <a:ln>
+            <a:noFill/>
+          </a:ln>
+          <a:effectLst/>
+          <a:extLst>
+            <a:ext uri="{91240B29-F687-4F45-9708-019B960494DF}">
+              <a14:hiddenLine xmlns:a14="http://schemas.microsoft.com/office/drawing/2010/main" w="9525">
+                <a:solidFill>
+                  <a:schemeClr val="tx1"/>
+                </a:solidFill>
+                <a:miter lim="800000"/>
+                <a:headEnd/>
+                <a:tailEnd/>
+              </a14:hiddenLine>
+            </a:ext>
+            <a:ext uri="{AF507438-7753-43E0-B8FC-AC1667EBCBE1}">
+              <a14:hiddenEffects xmlns:a14="http://schemas.microsoft.com/office/drawing/2010/main">
+                <a:effectLst>
+                  <a:outerShdw dist="35921" dir="2700000" algn="ctr" rotWithShape="0">
+                    <a:schemeClr val="bg2"/>
+                  </a:outerShdw>
+                </a:effectLst>
+              </a14:hiddenEffects>
+            </a:ext>
+          </a:extLst>
+        </p:spPr>
+        <p:txBody>
+          <a:bodyPr vert="horz" wrap="square" lIns="91440" tIns="45720" rIns="91440" bIns="45720" numCol="1" anchor="ctr" anchorCtr="0" compatLnSpc="1">
+            <a:prstTxWarp prst="textNoShape">
+              <a:avLst/>
+            </a:prstTxWarp>
+            <a:spAutoFit/>
+          </a:bodyPr>
+          <a:lstStyle/>
+          <a:p>
+            <a:pPr marL="0" marR="0" lvl="0" indent="0" algn="l" defTabSz="914400" rtl="0" eaLnBrk="0" fontAlgn="base" latinLnBrk="0" hangingPunct="0">
+              <a:lnSpc>
+                <a:spcPct val="100000"/>
+              </a:lnSpc>
+              <a:spcBef>
+                <a:spcPct val="0"/>
+              </a:spcBef>
+              <a:spcAft>
+                <a:spcPct val="0"/>
+              </a:spcAft>
+              <a:buClrTx/>
+              <a:buSzTx/>
+              <a:buFontTx/>
+              <a:buNone/>
+              <a:tabLst/>
+            </a:pPr>
+            <a:r>
+              <a:rPr kumimoji="0" lang="en-US" altLang="en-US" sz="2000" b="0" i="0" u="none" strike="noStrike" cap="none" normalizeH="0" baseline="0" dirty="0" smtClean="0">
+                <a:ln>
+                  <a:noFill/>
+                </a:ln>
+                <a:solidFill>
+                  <a:srgbClr val="E8BF6A"/>
+                </a:solidFill>
+                <a:effectLst/>
+                <a:latin typeface="JetBrains Mono"/>
+              </a:rPr>
+              <a:t>&lt;bean </a:t>
+            </a:r>
+            <a:r>
+              <a:rPr kumimoji="0" lang="en-US" altLang="en-US" sz="2000" b="0" i="0" u="none" strike="noStrike" cap="none" normalizeH="0" baseline="0" dirty="0" smtClean="0">
+                <a:ln>
+                  <a:noFill/>
+                </a:ln>
+                <a:solidFill>
+                  <a:srgbClr val="BABABA"/>
+                </a:solidFill>
+                <a:effectLst/>
+                <a:latin typeface="JetBrains Mono"/>
+              </a:rPr>
+              <a:t>id</a:t>
+            </a:r>
+            <a:r>
+              <a:rPr kumimoji="0" lang="en-US" altLang="en-US" sz="2000" b="0" i="0" u="none" strike="noStrike" cap="none" normalizeH="0" baseline="0" dirty="0" smtClean="0">
+                <a:ln>
+                  <a:noFill/>
+                </a:ln>
+                <a:solidFill>
+                  <a:srgbClr val="6A8759"/>
+                </a:solidFill>
+                <a:effectLst/>
+                <a:latin typeface="JetBrains Mono"/>
+              </a:rPr>
+              <a:t>="</a:t>
+            </a:r>
+            <a:r>
+              <a:rPr kumimoji="0" lang="en-US" altLang="en-US" sz="2000" b="0" i="0" u="none" strike="noStrike" cap="none" normalizeH="0" baseline="0" dirty="0" err="1" smtClean="0">
+                <a:ln>
+                  <a:noFill/>
+                </a:ln>
+                <a:solidFill>
+                  <a:srgbClr val="6A8759"/>
+                </a:solidFill>
+                <a:effectLst/>
+                <a:latin typeface="JetBrains Mono"/>
+              </a:rPr>
+              <a:t>petPerson</a:t>
+            </a:r>
+            <a:r>
+              <a:rPr kumimoji="0" lang="en-US" altLang="en-US" sz="2000" b="0" i="0" u="none" strike="noStrike" cap="none" normalizeH="0" baseline="0" dirty="0" smtClean="0">
+                <a:ln>
+                  <a:noFill/>
+                </a:ln>
+                <a:solidFill>
+                  <a:srgbClr val="6A8759"/>
+                </a:solidFill>
+                <a:effectLst/>
+                <a:latin typeface="JetBrains Mono"/>
+              </a:rPr>
+              <a:t>" </a:t>
+            </a:r>
+            <a:r>
+              <a:rPr kumimoji="0" lang="en-US" altLang="en-US" sz="2000" b="0" i="0" u="none" strike="noStrike" cap="none" normalizeH="0" baseline="0" dirty="0" smtClean="0">
+                <a:ln>
+                  <a:noFill/>
+                </a:ln>
+                <a:solidFill>
+                  <a:srgbClr val="BABABA"/>
+                </a:solidFill>
+                <a:effectLst/>
+                <a:latin typeface="JetBrains Mono"/>
+              </a:rPr>
+              <a:t>class</a:t>
+            </a:r>
+            <a:r>
+              <a:rPr kumimoji="0" lang="en-US" altLang="en-US" sz="2000" b="0" i="0" u="none" strike="noStrike" cap="none" normalizeH="0" baseline="0" dirty="0" smtClean="0">
+                <a:ln>
+                  <a:noFill/>
+                </a:ln>
+                <a:solidFill>
+                  <a:srgbClr val="6A8759"/>
+                </a:solidFill>
+                <a:effectLst/>
+                <a:latin typeface="JetBrains Mono"/>
+              </a:rPr>
+              <a:t>="com.volkov.IoC.example13.PetPerson"</a:t>
+            </a:r>
+            <a:br>
+              <a:rPr kumimoji="0" lang="en-US" altLang="en-US" sz="2000" b="0" i="0" u="none" strike="noStrike" cap="none" normalizeH="0" baseline="0" dirty="0" smtClean="0">
+                <a:ln>
+                  <a:noFill/>
+                </a:ln>
+                <a:solidFill>
+                  <a:srgbClr val="6A8759"/>
+                </a:solidFill>
+                <a:effectLst/>
+                <a:latin typeface="JetBrains Mono"/>
+              </a:rPr>
+            </a:br>
+            <a:r>
+              <a:rPr kumimoji="0" lang="en-US" altLang="en-US" sz="2000" b="0" i="0" u="none" strike="noStrike" cap="none" normalizeH="0" baseline="0" dirty="0" smtClean="0">
+                <a:ln>
+                  <a:noFill/>
+                </a:ln>
+                <a:solidFill>
+                  <a:srgbClr val="6A8759"/>
+                </a:solidFill>
+                <a:effectLst/>
+                <a:latin typeface="JetBrains Mono"/>
+              </a:rPr>
+              <a:t>    </a:t>
+            </a:r>
+            <a:r>
+              <a:rPr kumimoji="0" lang="en-US" altLang="en-US" sz="2000" b="0" i="0" u="none" strike="noStrike" cap="none" normalizeH="0" baseline="0" dirty="0" err="1" smtClean="0">
+                <a:ln>
+                  <a:noFill/>
+                </a:ln>
+                <a:solidFill>
+                  <a:srgbClr val="BABABA"/>
+                </a:solidFill>
+                <a:effectLst/>
+                <a:latin typeface="JetBrains Mono"/>
+              </a:rPr>
+              <a:t>autowire</a:t>
+            </a:r>
+            <a:r>
+              <a:rPr kumimoji="0" lang="en-US" altLang="en-US" sz="2000" b="0" i="0" u="none" strike="noStrike" cap="none" normalizeH="0" baseline="0" dirty="0" smtClean="0">
+                <a:ln>
+                  <a:noFill/>
+                </a:ln>
+                <a:solidFill>
+                  <a:srgbClr val="6A8759"/>
+                </a:solidFill>
+                <a:effectLst/>
+                <a:latin typeface="JetBrains Mono"/>
+              </a:rPr>
+              <a:t>="</a:t>
+            </a:r>
+            <a:r>
+              <a:rPr kumimoji="0" lang="en-US" altLang="en-US" sz="2000" b="0" i="0" u="none" strike="noStrike" cap="none" normalizeH="0" baseline="0" dirty="0" err="1" smtClean="0">
+                <a:ln>
+                  <a:noFill/>
+                </a:ln>
+                <a:solidFill>
+                  <a:srgbClr val="6A8759"/>
+                </a:solidFill>
+                <a:effectLst/>
+                <a:latin typeface="JetBrains Mono"/>
+              </a:rPr>
+              <a:t>byName</a:t>
+            </a:r>
+            <a:r>
+              <a:rPr kumimoji="0" lang="en-US" altLang="en-US" sz="2000" b="0" i="0" u="none" strike="noStrike" cap="none" normalizeH="0" baseline="0" dirty="0" smtClean="0">
+                <a:ln>
+                  <a:noFill/>
+                </a:ln>
+                <a:solidFill>
+                  <a:srgbClr val="6A8759"/>
+                </a:solidFill>
+                <a:effectLst/>
+                <a:latin typeface="JetBrains Mono"/>
+              </a:rPr>
+              <a:t>"</a:t>
+            </a:r>
+            <a:r>
+              <a:rPr kumimoji="0" lang="en-US" altLang="en-US" sz="2000" b="0" i="0" u="none" strike="noStrike" cap="none" normalizeH="0" baseline="0" dirty="0" smtClean="0">
+                <a:ln>
+                  <a:noFill/>
+                </a:ln>
+                <a:solidFill>
+                  <a:srgbClr val="E8BF6A"/>
+                </a:solidFill>
+                <a:effectLst/>
+                <a:latin typeface="JetBrains Mono"/>
+              </a:rPr>
+              <a:t>&gt;</a:t>
+            </a:r>
+            <a:br>
+              <a:rPr kumimoji="0" lang="en-US" altLang="en-US" sz="2000" b="0" i="0" u="none" strike="noStrike" cap="none" normalizeH="0" baseline="0" dirty="0" smtClean="0">
+                <a:ln>
+                  <a:noFill/>
+                </a:ln>
+                <a:solidFill>
+                  <a:srgbClr val="E8BF6A"/>
+                </a:solidFill>
+                <a:effectLst/>
+                <a:latin typeface="JetBrains Mono"/>
+              </a:rPr>
+            </a:br>
+            <a:r>
+              <a:rPr kumimoji="0" lang="en-US" altLang="en-US" sz="2000" b="0" i="0" u="none" strike="noStrike" cap="none" normalizeH="0" baseline="0" dirty="0" smtClean="0">
+                <a:ln>
+                  <a:noFill/>
+                </a:ln>
+                <a:solidFill>
+                  <a:srgbClr val="E8BF6A"/>
+                </a:solidFill>
+                <a:effectLst/>
+                <a:latin typeface="JetBrains Mono"/>
+              </a:rPr>
+              <a:t>&lt;/bean&gt;</a:t>
+            </a:r>
+            <a:endParaRPr kumimoji="0" lang="en-US" altLang="en-US" sz="2000" b="0" i="0" u="none" strike="noStrike" cap="none" normalizeH="0" baseline="0" dirty="0" smtClean="0">
+              <a:ln>
+                <a:noFill/>
+              </a:ln>
+              <a:solidFill>
+                <a:schemeClr val="tx1"/>
+              </a:solidFill>
+              <a:effectLst/>
+              <a:latin typeface="Arial" panose="020B0604020202020204" pitchFamily="34" charset="0"/>
+            </a:endParaRPr>
+          </a:p>
         </p:txBody>
       </p:sp>
     </p:spTree>
     <p:extLst>
       <p:ext uri="{BB962C8B-B14F-4D97-AF65-F5344CB8AC3E}">
         <p14:creationId xmlns:p14="http://schemas.microsoft.com/office/powerpoint/2010/main" val="2083790997"/>
+      </p:ext>
+    </p:extLst>
+  </p:cSld>
+  <p:clrMapOvr>
+    <a:masterClrMapping/>
+  </p:clrMapOvr>
+</p:sld>
+</file>
+
+<file path=ppt/slides/slide5.xml><?xml version="1.0" encoding="utf-8"?>
+<p:sld xmlns:a="http://schemas.openxmlformats.org/drawingml/2006/main" xmlns:r="http://schemas.openxmlformats.org/officeDocument/2006/relationships" xmlns:p="http://schemas.openxmlformats.org/presentationml/2006/main">
+  <p:cSld>
+    <p:spTree>
+      <p:nvGrpSpPr>
+        <p:cNvPr id="1" name=""/>
+        <p:cNvGrpSpPr/>
+        <p:nvPr/>
+      </p:nvGrpSpPr>
+      <p:grpSpPr>
+        <a:xfrm>
+          <a:off x="0" y="0"/>
+          <a:ext cx="0" cy="0"/>
+          <a:chOff x="0" y="0"/>
+          <a:chExt cx="0" cy="0"/>
+        </a:xfrm>
+      </p:grpSpPr>
+      <p:sp>
+        <p:nvSpPr>
+          <p:cNvPr id="3" name="Content Placeholder 2"/>
+          <p:cNvSpPr>
+            <a:spLocks noGrp="1"/>
+          </p:cNvSpPr>
+          <p:nvPr>
+            <p:ph idx="1"/>
+          </p:nvPr>
+        </p:nvSpPr>
+        <p:spPr>
+          <a:xfrm>
+            <a:off x="838200" y="619125"/>
+            <a:ext cx="10515600" cy="5557838"/>
+          </a:xfrm>
+        </p:spPr>
+        <p:txBody>
+          <a:bodyPr/>
+          <a:lstStyle/>
+          <a:p>
+            <a:pPr marL="0" indent="0">
+              <a:buNone/>
+            </a:pPr>
+            <a:r>
+              <a:rPr lang="ru-RU" dirty="0" smtClean="0"/>
+              <a:t>Т.е. если мы поменяем имя переменной на </a:t>
+            </a:r>
+            <a:r>
+              <a:rPr lang="en-US" dirty="0" smtClean="0"/>
+              <a:t>animal1</a:t>
+            </a:r>
+          </a:p>
+          <a:p>
+            <a:endParaRPr lang="en-US" dirty="0"/>
+          </a:p>
+          <a:p>
+            <a:endParaRPr lang="en-US" dirty="0" smtClean="0"/>
+          </a:p>
+          <a:p>
+            <a:endParaRPr lang="en-US" dirty="0"/>
+          </a:p>
+          <a:p>
+            <a:endParaRPr lang="en-US" dirty="0" smtClean="0"/>
+          </a:p>
+          <a:p>
+            <a:pPr marL="0" indent="0">
+              <a:buNone/>
+            </a:pPr>
+            <a:r>
+              <a:rPr lang="ru-RU" dirty="0" smtClean="0"/>
+              <a:t>Связывания всё равно не произойдёт, потому что имя = названию класса (только с маленькой буквы).</a:t>
+            </a:r>
+            <a:endParaRPr lang="en-US" dirty="0"/>
+          </a:p>
+        </p:txBody>
+      </p:sp>
+      <p:sp>
+        <p:nvSpPr>
+          <p:cNvPr id="4" name="Rectangle 1"/>
+          <p:cNvSpPr>
+            <a:spLocks noChangeArrowheads="1"/>
+          </p:cNvSpPr>
+          <p:nvPr/>
+        </p:nvSpPr>
+        <p:spPr bwMode="auto">
+          <a:xfrm>
+            <a:off x="838200" y="1284357"/>
+            <a:ext cx="2935419" cy="707886"/>
+          </a:xfrm>
+          <a:prstGeom prst="rect">
+            <a:avLst/>
+          </a:prstGeom>
+          <a:solidFill>
+            <a:srgbClr val="2B2B2B"/>
+          </a:solidFill>
+          <a:ln>
+            <a:noFill/>
+          </a:ln>
+          <a:effectLst/>
+          <a:extLst>
+            <a:ext uri="{91240B29-F687-4F45-9708-019B960494DF}">
+              <a14:hiddenLine xmlns:a14="http://schemas.microsoft.com/office/drawing/2010/main" w="9525">
+                <a:solidFill>
+                  <a:schemeClr val="tx1"/>
+                </a:solidFill>
+                <a:miter lim="800000"/>
+                <a:headEnd/>
+                <a:tailEnd/>
+              </a14:hiddenLine>
+            </a:ext>
+            <a:ext uri="{AF507438-7753-43E0-B8FC-AC1667EBCBE1}">
+              <a14:hiddenEffects xmlns:a14="http://schemas.microsoft.com/office/drawing/2010/main">
+                <a:effectLst>
+                  <a:outerShdw dist="35921" dir="2700000" algn="ctr" rotWithShape="0">
+                    <a:schemeClr val="bg2"/>
+                  </a:outerShdw>
+                </a:effectLst>
+              </a14:hiddenEffects>
+            </a:ext>
+          </a:extLst>
+        </p:spPr>
+        <p:txBody>
+          <a:bodyPr vert="horz" wrap="none" lIns="91440" tIns="45720" rIns="91440" bIns="45720" numCol="1" anchor="ctr" anchorCtr="0" compatLnSpc="1">
+            <a:prstTxWarp prst="textNoShape">
+              <a:avLst/>
+            </a:prstTxWarp>
+            <a:spAutoFit/>
+          </a:bodyPr>
+          <a:lstStyle/>
+          <a:p>
+            <a:pPr marL="0" marR="0" lvl="0" indent="0" algn="l" defTabSz="914400" rtl="0" eaLnBrk="0" fontAlgn="base" latinLnBrk="0" hangingPunct="0">
+              <a:lnSpc>
+                <a:spcPct val="100000"/>
+              </a:lnSpc>
+              <a:spcBef>
+                <a:spcPct val="0"/>
+              </a:spcBef>
+              <a:spcAft>
+                <a:spcPct val="0"/>
+              </a:spcAft>
+              <a:buClrTx/>
+              <a:buSzTx/>
+              <a:buFontTx/>
+              <a:buNone/>
+              <a:tabLst/>
+            </a:pPr>
+            <a:r>
+              <a:rPr kumimoji="0" lang="en-US" altLang="en-US" sz="2000" b="0" i="0" u="none" strike="noStrike" cap="none" normalizeH="0" baseline="0" dirty="0" smtClean="0">
+                <a:ln>
+                  <a:noFill/>
+                </a:ln>
+                <a:solidFill>
+                  <a:srgbClr val="CC7832"/>
+                </a:solidFill>
+                <a:effectLst/>
+                <a:latin typeface="JetBrains Mono"/>
+              </a:rPr>
+              <a:t>public class </a:t>
+            </a:r>
+            <a:r>
+              <a:rPr kumimoji="0" lang="en-US" altLang="en-US" sz="2000" b="0" i="0" u="none" strike="noStrike" cap="none" normalizeH="0" baseline="0" dirty="0" err="1" smtClean="0">
+                <a:ln>
+                  <a:noFill/>
+                </a:ln>
+                <a:solidFill>
+                  <a:srgbClr val="A9B7C6"/>
+                </a:solidFill>
+                <a:effectLst/>
+                <a:latin typeface="JetBrains Mono"/>
+              </a:rPr>
+              <a:t>PetPerson</a:t>
+            </a:r>
+            <a:r>
+              <a:rPr kumimoji="0" lang="en-US" altLang="en-US" sz="2000" b="0" i="0" u="none" strike="noStrike" cap="none" normalizeH="0" baseline="0" dirty="0" smtClean="0">
+                <a:ln>
+                  <a:noFill/>
+                </a:ln>
+                <a:solidFill>
+                  <a:srgbClr val="A9B7C6"/>
+                </a:solidFill>
+                <a:effectLst/>
+                <a:latin typeface="JetBrains Mono"/>
+              </a:rPr>
+              <a:t> {</a:t>
+            </a:r>
+            <a:br>
+              <a:rPr kumimoji="0" lang="en-US" altLang="en-US" sz="2000" b="0" i="0" u="none" strike="noStrike" cap="none" normalizeH="0" baseline="0" dirty="0" smtClean="0">
+                <a:ln>
+                  <a:noFill/>
+                </a:ln>
+                <a:solidFill>
+                  <a:srgbClr val="A9B7C6"/>
+                </a:solidFill>
+                <a:effectLst/>
+                <a:latin typeface="JetBrains Mono"/>
+              </a:rPr>
+            </a:br>
+            <a:r>
+              <a:rPr kumimoji="0" lang="en-US" altLang="en-US" sz="2000" b="0" i="0" u="none" strike="noStrike" cap="none" normalizeH="0" baseline="0" dirty="0" smtClean="0">
+                <a:ln>
+                  <a:noFill/>
+                </a:ln>
+                <a:solidFill>
+                  <a:srgbClr val="A9B7C6"/>
+                </a:solidFill>
+                <a:effectLst/>
+                <a:latin typeface="JetBrains Mono"/>
+              </a:rPr>
+              <a:t>    Animal </a:t>
+            </a:r>
+            <a:r>
+              <a:rPr kumimoji="0" lang="en-US" altLang="en-US" sz="2000" b="0" i="0" u="none" strike="noStrike" cap="none" normalizeH="0" baseline="0" dirty="0" smtClean="0">
+                <a:ln>
+                  <a:noFill/>
+                </a:ln>
+                <a:solidFill>
+                  <a:srgbClr val="9876AA"/>
+                </a:solidFill>
+                <a:effectLst/>
+                <a:latin typeface="JetBrains Mono"/>
+              </a:rPr>
+              <a:t>animal1</a:t>
+            </a:r>
+            <a:r>
+              <a:rPr kumimoji="0" lang="en-US" altLang="en-US" sz="2000" b="0" i="0" u="none" strike="noStrike" cap="none" normalizeH="0" baseline="0" dirty="0" smtClean="0">
+                <a:ln>
+                  <a:noFill/>
+                </a:ln>
+                <a:solidFill>
+                  <a:srgbClr val="CC7832"/>
+                </a:solidFill>
+                <a:effectLst/>
+                <a:latin typeface="JetBrains Mono"/>
+              </a:rPr>
+              <a:t>;</a:t>
+            </a:r>
+            <a:endParaRPr kumimoji="0" lang="en-US" altLang="en-US" sz="2000" b="0" i="0" u="none" strike="noStrike" cap="none" normalizeH="0" baseline="0" dirty="0" smtClean="0">
+              <a:ln>
+                <a:noFill/>
+              </a:ln>
+              <a:solidFill>
+                <a:schemeClr val="tx1"/>
+              </a:solidFill>
+              <a:effectLst/>
+              <a:latin typeface="Arial" panose="020B0604020202020204" pitchFamily="34" charset="0"/>
+            </a:endParaRPr>
+          </a:p>
+        </p:txBody>
+      </p:sp>
+      <p:sp>
+        <p:nvSpPr>
+          <p:cNvPr id="5" name="Rectangle 2"/>
+          <p:cNvSpPr>
+            <a:spLocks noChangeArrowheads="1"/>
+          </p:cNvSpPr>
+          <p:nvPr/>
+        </p:nvSpPr>
+        <p:spPr bwMode="auto">
+          <a:xfrm>
+            <a:off x="4524375" y="1284357"/>
+            <a:ext cx="5762625" cy="1323439"/>
+          </a:xfrm>
+          <a:prstGeom prst="rect">
+            <a:avLst/>
+          </a:prstGeom>
+          <a:solidFill>
+            <a:srgbClr val="2B2B2B"/>
+          </a:solidFill>
+          <a:ln>
+            <a:noFill/>
+          </a:ln>
+          <a:effectLst/>
+          <a:extLst>
+            <a:ext uri="{91240B29-F687-4F45-9708-019B960494DF}">
+              <a14:hiddenLine xmlns:a14="http://schemas.microsoft.com/office/drawing/2010/main" w="9525">
+                <a:solidFill>
+                  <a:schemeClr val="tx1"/>
+                </a:solidFill>
+                <a:miter lim="800000"/>
+                <a:headEnd/>
+                <a:tailEnd/>
+              </a14:hiddenLine>
+            </a:ext>
+            <a:ext uri="{AF507438-7753-43E0-B8FC-AC1667EBCBE1}">
+              <a14:hiddenEffects xmlns:a14="http://schemas.microsoft.com/office/drawing/2010/main">
+                <a:effectLst>
+                  <a:outerShdw dist="35921" dir="2700000" algn="ctr" rotWithShape="0">
+                    <a:schemeClr val="bg2"/>
+                  </a:outerShdw>
+                </a:effectLst>
+              </a14:hiddenEffects>
+            </a:ext>
+          </a:extLst>
+        </p:spPr>
+        <p:txBody>
+          <a:bodyPr vert="horz" wrap="square" lIns="91440" tIns="45720" rIns="91440" bIns="45720" numCol="1" anchor="ctr" anchorCtr="0" compatLnSpc="1">
+            <a:prstTxWarp prst="textNoShape">
+              <a:avLst/>
+            </a:prstTxWarp>
+            <a:spAutoFit/>
+          </a:bodyPr>
+          <a:lstStyle/>
+          <a:p>
+            <a:pPr marL="0" marR="0" lvl="0" indent="0" algn="l" defTabSz="914400" rtl="0" eaLnBrk="0" fontAlgn="base" latinLnBrk="0" hangingPunct="0">
+              <a:lnSpc>
+                <a:spcPct val="100000"/>
+              </a:lnSpc>
+              <a:spcBef>
+                <a:spcPct val="0"/>
+              </a:spcBef>
+              <a:spcAft>
+                <a:spcPct val="0"/>
+              </a:spcAft>
+              <a:buClrTx/>
+              <a:buSzTx/>
+              <a:buFontTx/>
+              <a:buNone/>
+              <a:tabLst/>
+            </a:pPr>
+            <a:r>
+              <a:rPr kumimoji="0" lang="en-US" altLang="en-US" sz="2000" b="0" i="0" u="none" strike="noStrike" cap="none" normalizeH="0" baseline="0" dirty="0" smtClean="0">
+                <a:ln>
+                  <a:noFill/>
+                </a:ln>
+                <a:solidFill>
+                  <a:srgbClr val="E8BF6A"/>
+                </a:solidFill>
+                <a:effectLst/>
+                <a:latin typeface="JetBrains Mono"/>
+              </a:rPr>
+              <a:t>&lt;bean </a:t>
+            </a:r>
+            <a:r>
+              <a:rPr kumimoji="0" lang="en-US" altLang="en-US" sz="2000" b="0" i="0" u="none" strike="noStrike" cap="none" normalizeH="0" baseline="0" dirty="0" smtClean="0">
+                <a:ln>
+                  <a:noFill/>
+                </a:ln>
+                <a:solidFill>
+                  <a:srgbClr val="BABABA"/>
+                </a:solidFill>
+                <a:effectLst/>
+                <a:latin typeface="JetBrains Mono"/>
+              </a:rPr>
+              <a:t>id</a:t>
+            </a:r>
+            <a:r>
+              <a:rPr kumimoji="0" lang="en-US" altLang="en-US" sz="2000" b="0" i="0" u="none" strike="noStrike" cap="none" normalizeH="0" baseline="0" dirty="0" smtClean="0">
+                <a:ln>
+                  <a:noFill/>
+                </a:ln>
+                <a:solidFill>
+                  <a:srgbClr val="6A8759"/>
+                </a:solidFill>
+                <a:effectLst/>
+                <a:latin typeface="JetBrains Mono"/>
+              </a:rPr>
+              <a:t>="</a:t>
+            </a:r>
+            <a:r>
+              <a:rPr kumimoji="0" lang="en-US" altLang="en-US" sz="2000" b="0" i="0" u="none" strike="noStrike" cap="none" normalizeH="0" baseline="0" dirty="0" err="1" smtClean="0">
+                <a:ln>
+                  <a:noFill/>
+                </a:ln>
+                <a:solidFill>
+                  <a:srgbClr val="6A8759"/>
+                </a:solidFill>
+                <a:effectLst/>
+                <a:latin typeface="JetBrains Mono"/>
+              </a:rPr>
+              <a:t>petPerson</a:t>
+            </a:r>
+            <a:r>
+              <a:rPr kumimoji="0" lang="en-US" altLang="en-US" sz="2000" b="0" i="0" u="none" strike="noStrike" cap="none" normalizeH="0" baseline="0" dirty="0" smtClean="0">
+                <a:ln>
+                  <a:noFill/>
+                </a:ln>
+                <a:solidFill>
+                  <a:srgbClr val="6A8759"/>
+                </a:solidFill>
+                <a:effectLst/>
+                <a:latin typeface="JetBrains Mono"/>
+              </a:rPr>
+              <a:t>" </a:t>
+            </a:r>
+            <a:r>
+              <a:rPr kumimoji="0" lang="en-US" altLang="en-US" sz="2000" b="0" i="0" u="none" strike="noStrike" cap="none" normalizeH="0" baseline="0" dirty="0" smtClean="0">
+                <a:ln>
+                  <a:noFill/>
+                </a:ln>
+                <a:solidFill>
+                  <a:srgbClr val="BABABA"/>
+                </a:solidFill>
+                <a:effectLst/>
+                <a:latin typeface="JetBrains Mono"/>
+              </a:rPr>
+              <a:t>class</a:t>
+            </a:r>
+            <a:r>
+              <a:rPr kumimoji="0" lang="en-US" altLang="en-US" sz="2000" b="0" i="0" u="none" strike="noStrike" cap="none" normalizeH="0" baseline="0" dirty="0" smtClean="0">
+                <a:ln>
+                  <a:noFill/>
+                </a:ln>
+                <a:solidFill>
+                  <a:srgbClr val="6A8759"/>
+                </a:solidFill>
+                <a:effectLst/>
+                <a:latin typeface="JetBrains Mono"/>
+              </a:rPr>
+              <a:t>="com.volkov.IoC.example13.PetPerson"</a:t>
+            </a:r>
+            <a:br>
+              <a:rPr kumimoji="0" lang="en-US" altLang="en-US" sz="2000" b="0" i="0" u="none" strike="noStrike" cap="none" normalizeH="0" baseline="0" dirty="0" smtClean="0">
+                <a:ln>
+                  <a:noFill/>
+                </a:ln>
+                <a:solidFill>
+                  <a:srgbClr val="6A8759"/>
+                </a:solidFill>
+                <a:effectLst/>
+                <a:latin typeface="JetBrains Mono"/>
+              </a:rPr>
+            </a:br>
+            <a:r>
+              <a:rPr kumimoji="0" lang="en-US" altLang="en-US" sz="2000" b="0" i="0" u="none" strike="noStrike" cap="none" normalizeH="0" baseline="0" dirty="0" smtClean="0">
+                <a:ln>
+                  <a:noFill/>
+                </a:ln>
+                <a:solidFill>
+                  <a:srgbClr val="6A8759"/>
+                </a:solidFill>
+                <a:effectLst/>
+                <a:latin typeface="JetBrains Mono"/>
+              </a:rPr>
+              <a:t>    </a:t>
+            </a:r>
+            <a:r>
+              <a:rPr kumimoji="0" lang="en-US" altLang="en-US" sz="2000" b="0" i="0" u="none" strike="noStrike" cap="none" normalizeH="0" baseline="0" dirty="0" err="1" smtClean="0">
+                <a:ln>
+                  <a:noFill/>
+                </a:ln>
+                <a:solidFill>
+                  <a:srgbClr val="BABABA"/>
+                </a:solidFill>
+                <a:effectLst/>
+                <a:latin typeface="JetBrains Mono"/>
+              </a:rPr>
+              <a:t>autowire</a:t>
+            </a:r>
+            <a:r>
+              <a:rPr kumimoji="0" lang="en-US" altLang="en-US" sz="2000" b="0" i="0" u="none" strike="noStrike" cap="none" normalizeH="0" baseline="0" dirty="0" smtClean="0">
+                <a:ln>
+                  <a:noFill/>
+                </a:ln>
+                <a:solidFill>
+                  <a:srgbClr val="6A8759"/>
+                </a:solidFill>
+                <a:effectLst/>
+                <a:latin typeface="JetBrains Mono"/>
+              </a:rPr>
+              <a:t>="</a:t>
+            </a:r>
+            <a:r>
+              <a:rPr kumimoji="0" lang="en-US" altLang="en-US" sz="2000" b="0" i="0" u="none" strike="noStrike" cap="none" normalizeH="0" baseline="0" dirty="0" err="1" smtClean="0">
+                <a:ln>
+                  <a:noFill/>
+                </a:ln>
+                <a:solidFill>
+                  <a:srgbClr val="6A8759"/>
+                </a:solidFill>
+                <a:effectLst/>
+                <a:latin typeface="JetBrains Mono"/>
+              </a:rPr>
+              <a:t>byName</a:t>
+            </a:r>
+            <a:r>
+              <a:rPr kumimoji="0" lang="en-US" altLang="en-US" sz="2000" b="0" i="0" u="none" strike="noStrike" cap="none" normalizeH="0" baseline="0" dirty="0" smtClean="0">
+                <a:ln>
+                  <a:noFill/>
+                </a:ln>
+                <a:solidFill>
+                  <a:srgbClr val="6A8759"/>
+                </a:solidFill>
+                <a:effectLst/>
+                <a:latin typeface="JetBrains Mono"/>
+              </a:rPr>
+              <a:t>"</a:t>
+            </a:r>
+            <a:r>
+              <a:rPr kumimoji="0" lang="en-US" altLang="en-US" sz="2000" b="0" i="0" u="none" strike="noStrike" cap="none" normalizeH="0" baseline="0" dirty="0" smtClean="0">
+                <a:ln>
+                  <a:noFill/>
+                </a:ln>
+                <a:solidFill>
+                  <a:srgbClr val="E8BF6A"/>
+                </a:solidFill>
+                <a:effectLst/>
+                <a:latin typeface="JetBrains Mono"/>
+              </a:rPr>
+              <a:t>&gt;</a:t>
+            </a:r>
+            <a:br>
+              <a:rPr kumimoji="0" lang="en-US" altLang="en-US" sz="2000" b="0" i="0" u="none" strike="noStrike" cap="none" normalizeH="0" baseline="0" dirty="0" smtClean="0">
+                <a:ln>
+                  <a:noFill/>
+                </a:ln>
+                <a:solidFill>
+                  <a:srgbClr val="E8BF6A"/>
+                </a:solidFill>
+                <a:effectLst/>
+                <a:latin typeface="JetBrains Mono"/>
+              </a:rPr>
+            </a:br>
+            <a:r>
+              <a:rPr kumimoji="0" lang="en-US" altLang="en-US" sz="2000" b="0" i="0" u="none" strike="noStrike" cap="none" normalizeH="0" baseline="0" dirty="0" smtClean="0">
+                <a:ln>
+                  <a:noFill/>
+                </a:ln>
+                <a:solidFill>
+                  <a:srgbClr val="E8BF6A"/>
+                </a:solidFill>
+                <a:effectLst/>
+                <a:latin typeface="JetBrains Mono"/>
+              </a:rPr>
+              <a:t>&lt;/bean&gt;</a:t>
+            </a:r>
+            <a:endParaRPr kumimoji="0" lang="en-US" altLang="en-US" sz="2000" b="0" i="0" u="none" strike="noStrike" cap="none" normalizeH="0" baseline="0" dirty="0" smtClean="0">
+              <a:ln>
+                <a:noFill/>
+              </a:ln>
+              <a:solidFill>
+                <a:schemeClr val="tx1"/>
+              </a:solidFill>
+              <a:effectLst/>
+              <a:latin typeface="Arial" panose="020B0604020202020204" pitchFamily="34" charset="0"/>
+            </a:endParaRPr>
+          </a:p>
+        </p:txBody>
+      </p:sp>
+    </p:spTree>
+    <p:extLst>
+      <p:ext uri="{BB962C8B-B14F-4D97-AF65-F5344CB8AC3E}">
+        <p14:creationId xmlns:p14="http://schemas.microsoft.com/office/powerpoint/2010/main" val="3025374423"/>
       </p:ext>
     </p:extLst>
   </p:cSld>

</xml_diff>